<commit_message>
Added gitrepo-path to powerpoint.
</commit_message>
<xml_diff>
--- a/Introduction to F#.pptx
+++ b/Introduction to F#.pptx
@@ -199,7 +199,7 @@
             <a:fld id="{4180EC96-23B5-4301-8B91-BF70EABF146D}" type="datetimeFigureOut">
               <a:rPr lang="en-US" smtClean="0"/>
               <a:pPr/>
-              <a:t>10/5/2009</a:t>
+              <a:t>1/20/2010</a:t>
             </a:fld>
             <a:endParaRPr lang="en-US" dirty="0"/>
           </a:p>
@@ -361,7 +361,7 @@
             <a:fld id="{7A94D76D-ACEA-4E66-9040-0707EFD59D28}" type="datetimeFigureOut">
               <a:rPr lang="en-US" smtClean="0"/>
               <a:pPr/>
-              <a:t>10/5/2009</a:t>
+              <a:t>1/20/2010</a:t>
             </a:fld>
             <a:endParaRPr lang="en-US"/>
           </a:p>
@@ -728,6 +728,88 @@
       </p:grpSpPr>
       <p:sp>
         <p:nvSpPr>
+          <p:cNvPr id="2" name="Folienbildplatzhalter 1"/>
+          <p:cNvSpPr>
+            <a:spLocks noGrp="1" noRot="1" noChangeAspect="1"/>
+          </p:cNvSpPr>
+          <p:nvPr>
+            <p:ph type="sldImg"/>
+          </p:nvPr>
+        </p:nvSpPr>
+        <p:spPr/>
+      </p:sp>
+      <p:sp>
+        <p:nvSpPr>
+          <p:cNvPr id="3" name="Notizenplatzhalter 2"/>
+          <p:cNvSpPr>
+            <a:spLocks noGrp="1"/>
+          </p:cNvSpPr>
+          <p:nvPr>
+            <p:ph type="body" idx="1"/>
+          </p:nvPr>
+        </p:nvSpPr>
+        <p:spPr/>
+        <p:txBody>
+          <a:bodyPr>
+            <a:normAutofit/>
+          </a:bodyPr>
+          <a:lstStyle/>
+          <a:p>
+            <a:endParaRPr lang="de-DE"/>
+          </a:p>
+        </p:txBody>
+      </p:sp>
+      <p:sp>
+        <p:nvSpPr>
+          <p:cNvPr id="4" name="Foliennummernplatzhalter 3"/>
+          <p:cNvSpPr>
+            <a:spLocks noGrp="1"/>
+          </p:cNvSpPr>
+          <p:nvPr>
+            <p:ph type="sldNum" sz="quarter" idx="10"/>
+          </p:nvPr>
+        </p:nvSpPr>
+        <p:spPr/>
+        <p:txBody>
+          <a:bodyPr/>
+          <a:lstStyle/>
+          <a:p>
+            <a:fld id="{FE5C90B4-74E4-420E-9E3F-548EA925D0FC}" type="slidenum">
+              <a:rPr lang="en-US" smtClean="0"/>
+              <a:pPr/>
+              <a:t>2</a:t>
+            </a:fld>
+            <a:endParaRPr lang="en-US"/>
+          </a:p>
+        </p:txBody>
+      </p:sp>
+    </p:spTree>
+  </p:cSld>
+  <p:clrMapOvr>
+    <a:masterClrMapping/>
+  </p:clrMapOvr>
+</p:notes>
+</file>
+
+<file path=ppt/notesSlides/notesSlide3.xml><?xml version="1.0" encoding="utf-8"?>
+<p:notes xmlns:a="http://schemas.openxmlformats.org/drawingml/2006/main" xmlns:r="http://schemas.openxmlformats.org/officeDocument/2006/relationships" xmlns:p="http://schemas.openxmlformats.org/presentationml/2006/main">
+  <p:cSld>
+    <p:spTree>
+      <p:nvGrpSpPr>
+        <p:cNvPr id="1" name=""/>
+        <p:cNvGrpSpPr/>
+        <p:nvPr/>
+      </p:nvGrpSpPr>
+      <p:grpSpPr>
+        <a:xfrm>
+          <a:off x="0" y="0"/>
+          <a:ext cx="0" cy="0"/>
+          <a:chOff x="0" y="0"/>
+          <a:chExt cx="0" cy="0"/>
+        </a:xfrm>
+      </p:grpSpPr>
+      <p:sp>
+        <p:nvSpPr>
           <p:cNvPr id="2" name="Slide Image Placeholder 1"/>
           <p:cNvSpPr>
             <a:spLocks noGrp="1" noRot="1" noChangeAspect="1"/>
@@ -746,7 +828,7 @@
 </p:notes>
 </file>
 
-<file path=ppt/notesSlides/notesSlide3.xml><?xml version="1.0" encoding="utf-8"?>
+<file path=ppt/notesSlides/notesSlide4.xml><?xml version="1.0" encoding="utf-8"?>
 <p:notes xmlns:a="http://schemas.openxmlformats.org/drawingml/2006/main" xmlns:r="http://schemas.openxmlformats.org/officeDocument/2006/relationships" xmlns:p="http://schemas.openxmlformats.org/presentationml/2006/main">
   <p:cSld>
     <p:spTree>
@@ -808,7 +890,7 @@
         </p:nvSpPr>
         <p:spPr bwMode="ltGray">
           <a:xfrm>
-            <a:off x="2" y="1"/>
+            <a:off x="0" y="228600"/>
             <a:ext cx="9143999" cy="5135431"/>
           </a:xfrm>
           <a:prstGeom prst="rect">
@@ -859,7 +941,7 @@
         </p:nvSpPr>
         <p:spPr>
           <a:xfrm>
-            <a:off x="685800" y="3355848"/>
+            <a:off x="609600" y="2438400"/>
             <a:ext cx="8077200" cy="1673352"/>
           </a:xfrm>
         </p:spPr>
@@ -903,7 +985,7 @@
         </p:nvSpPr>
         <p:spPr>
           <a:xfrm>
-            <a:off x="685800" y="1828800"/>
+            <a:off x="685800" y="533400"/>
             <a:ext cx="8077200" cy="1499616"/>
           </a:xfrm>
         </p:spPr>
@@ -1017,7 +1099,7 @@
         </p:nvSpPr>
         <p:spPr bwMode="invGray">
           <a:xfrm>
-            <a:off x="0" y="5128335"/>
+            <a:off x="0" y="4267200"/>
             <a:ext cx="9144000" cy="45720"/>
           </a:xfrm>
           <a:prstGeom prst="rect">
@@ -2963,7 +3045,7 @@
             <a:fld id="{75429ADD-C5BF-4814-8EAF-17BB58E1B0D2}" type="datetimeFigureOut">
               <a:rPr lang="en-US" smtClean="0"/>
               <a:pPr/>
-              <a:t>10/5/2009</a:t>
+              <a:t>1/20/2010</a:t>
             </a:fld>
             <a:endParaRPr lang="en-US" dirty="0"/>
           </a:p>
@@ -3758,8 +3840,8 @@
         </p:nvSpPr>
         <p:spPr bwMode="auto">
           <a:xfrm>
-            <a:off x="390524" y="5111750"/>
-            <a:ext cx="5553075" cy="1136650"/>
+            <a:off x="381000" y="4419600"/>
+            <a:ext cx="5553075" cy="2286000"/>
           </a:xfrm>
           <a:prstGeom prst="rect">
             <a:avLst/>
@@ -3787,7 +3869,47 @@
               </a:rPr>
               <a:t>Steffen Forkmann</a:t>
             </a:r>
-            <a:endParaRPr lang="en-US" sz="2800" b="1" dirty="0" smtClean="0">
+          </a:p>
+          <a:p>
+            <a:pPr marL="342900" indent="-342900" algn="l" rtl="0">
+              <a:buClr>
+                <a:srgbClr val="00B0F0"/>
+              </a:buClr>
+            </a:pPr>
+            <a:r>
+              <a:rPr lang="en-US" sz="2800" b="1" dirty="0" err="1" smtClean="0">
+                <a:latin typeface="Calibri" pitchFamily="34" charset="0"/>
+              </a:rPr>
+              <a:t>msu</a:t>
+            </a:r>
+            <a:r>
+              <a:rPr lang="en-US" sz="2800" b="1" dirty="0" smtClean="0">
+                <a:latin typeface="Calibri" pitchFamily="34" charset="0"/>
+              </a:rPr>
+              <a:t> solutions GmbH</a:t>
+            </a:r>
+          </a:p>
+          <a:p>
+            <a:pPr marL="342900" indent="-342900" algn="l" rtl="0">
+              <a:buClr>
+                <a:srgbClr val="00B0F0"/>
+              </a:buClr>
+            </a:pPr>
+            <a:r>
+              <a:rPr lang="en-US" sz="2800" dirty="0" smtClean="0">
+                <a:latin typeface="Calibri" pitchFamily="34" charset="0"/>
+                <a:hlinkClick r:id="rId3"/>
+              </a:rPr>
+              <a:t>http://</a:t>
+            </a:r>
+            <a:r>
+              <a:rPr lang="en-US" sz="2800" dirty="0" smtClean="0">
+                <a:latin typeface="Calibri" pitchFamily="34" charset="0"/>
+                <a:hlinkClick r:id="rId3"/>
+              </a:rPr>
+              <a:t>www.navision-blog.de</a:t>
+            </a:r>
+            <a:endParaRPr lang="en-US" sz="2800" dirty="0" smtClean="0">
               <a:latin typeface="Calibri" pitchFamily="34" charset="0"/>
             </a:endParaRPr>
           </a:p>
@@ -3798,20 +3920,32 @@
               </a:buClr>
             </a:pPr>
             <a:r>
-              <a:rPr lang="en-US" sz="2800" b="1" dirty="0" err="1" smtClean="0">
+              <a:rPr lang="en-US" sz="2800" dirty="0" smtClean="0">
                 <a:latin typeface="Calibri" pitchFamily="34" charset="0"/>
-              </a:rPr>
-              <a:t>msu</a:t>
-            </a:r>
-            <a:r>
-              <a:rPr lang="en-US" sz="2800" b="1" dirty="0" smtClean="0">
+                <a:hlinkClick r:id="rId4"/>
+              </a:rPr>
+              <a:t>http</a:t>
+            </a:r>
+            <a:r>
+              <a:rPr lang="en-US" sz="2800" dirty="0" smtClean="0">
                 <a:latin typeface="Calibri" pitchFamily="34" charset="0"/>
-              </a:rPr>
-              <a:t> solutions GmbH</a:t>
-            </a:r>
+                <a:hlinkClick r:id="rId4"/>
+              </a:rPr>
+              <a:t>://</a:t>
+            </a:r>
+            <a:r>
+              <a:rPr lang="en-US" sz="2800" dirty="0" smtClean="0">
+                <a:latin typeface="Calibri" pitchFamily="34" charset="0"/>
+                <a:hlinkClick r:id="rId4"/>
+              </a:rPr>
+              <a:t>www.twitter.com/sforkmann</a:t>
+            </a:r>
+            <a:endParaRPr lang="en-US" sz="2800" dirty="0" smtClean="0">
+              <a:latin typeface="Calibri" pitchFamily="34" charset="0"/>
+            </a:endParaRPr>
           </a:p>
           <a:p>
-            <a:pPr marL="342900" indent="-342900" algn="l" rtl="0">
+            <a:pPr marL="342900" indent="-342900">
               <a:buClr>
                 <a:srgbClr val="00B0F0"/>
               </a:buClr>
@@ -3819,22 +3953,27 @@
             <a:r>
               <a:rPr lang="en-US" sz="2800" dirty="0" smtClean="0">
                 <a:latin typeface="Calibri" pitchFamily="34" charset="0"/>
-              </a:rPr>
-              <a:t>http://www.navision-blog.de</a:t>
-            </a:r>
+                <a:hlinkClick r:id="rId5"/>
+              </a:rPr>
+              <a:t>http://</a:t>
+            </a:r>
+            <a:r>
+              <a:rPr lang="en-US" sz="2800" dirty="0" smtClean="0">
+                <a:latin typeface="Calibri" pitchFamily="34" charset="0"/>
+                <a:hlinkClick r:id="rId5"/>
+              </a:rPr>
+              <a:t>github.com/forki/FSharpTalk</a:t>
+            </a:r>
+            <a:endParaRPr lang="en-US" sz="2800" dirty="0" smtClean="0">
+              <a:latin typeface="Calibri" pitchFamily="34" charset="0"/>
+            </a:endParaRPr>
           </a:p>
           <a:p>
-            <a:pPr marL="342900" indent="-342900" algn="l" rtl="0">
+            <a:pPr marL="342900" indent="-342900">
               <a:buClr>
                 <a:srgbClr val="00B0F0"/>
               </a:buClr>
             </a:pPr>
-            <a:r>
-              <a:rPr lang="en-US" sz="2800" dirty="0" smtClean="0">
-                <a:latin typeface="Calibri" pitchFamily="34" charset="0"/>
-              </a:rPr>
-              <a:t>http://www.twitter.com/sforkmann</a:t>
-            </a:r>
             <a:endParaRPr lang="en-US" sz="2800" dirty="0" smtClean="0">
               <a:latin typeface="Calibri" pitchFamily="34" charset="0"/>
             </a:endParaRPr>
@@ -22389,11 +22528,7 @@
           <a:p>
             <a:r>
               <a:rPr lang="en-GB" dirty="0" smtClean="0"/>
-              <a:t>Asynchronous </a:t>
-            </a:r>
-            <a:r>
-              <a:rPr lang="en-GB" dirty="0" smtClean="0"/>
-              <a:t>I/O</a:t>
+              <a:t>Asynchronous I/O</a:t>
             </a:r>
             <a:endParaRPr lang="en-GB" dirty="0"/>
           </a:p>
@@ -28199,11 +28334,7 @@
           <a:p>
             <a:r>
               <a:rPr lang="en-GB" dirty="0" smtClean="0"/>
-              <a:t>Asynchronous </a:t>
-            </a:r>
-            <a:r>
-              <a:rPr lang="en-GB" dirty="0" smtClean="0"/>
-              <a:t>I/O</a:t>
+              <a:t>Asynchronous I/O</a:t>
             </a:r>
             <a:endParaRPr lang="en-GB" dirty="0"/>
           </a:p>

</xml_diff>